<commit_message>
Added new SerialRead example
</commit_message>
<xml_diff>
--- a/Introduction to the Arduino.pptx
+++ b/Introduction to the Arduino.pptx
@@ -26,9 +26,11 @@
     <p:sldId id="274" r:id="rId20"/>
     <p:sldId id="275" r:id="rId21"/>
     <p:sldId id="276" r:id="rId22"/>
-    <p:sldId id="277" r:id="rId23"/>
-    <p:sldId id="278" r:id="rId24"/>
-    <p:sldId id="260" r:id="rId25"/>
+    <p:sldId id="281" r:id="rId23"/>
+    <p:sldId id="282" r:id="rId24"/>
+    <p:sldId id="277" r:id="rId25"/>
+    <p:sldId id="278" r:id="rId26"/>
+    <p:sldId id="260" r:id="rId27"/>
   </p:sldIdLst>
   <p:sldSz cx="12192000" cy="6858000"/>
   <p:notesSz cx="6858000" cy="9144000"/>
@@ -266,7 +268,7 @@
           <a:p>
             <a:fld id="{65028CB8-6F2D-41FE-9209-0336CA312381}" type="datetimeFigureOut">
               <a:rPr lang="en-US" smtClean="0"/>
-              <a:t>1/3/2015</a:t>
+              <a:t>5/18/2015</a:t>
             </a:fld>
             <a:endParaRPr lang="en-US"/>
           </a:p>
@@ -436,7 +438,7 @@
           <a:p>
             <a:fld id="{65028CB8-6F2D-41FE-9209-0336CA312381}" type="datetimeFigureOut">
               <a:rPr lang="en-US" smtClean="0"/>
-              <a:t>1/3/2015</a:t>
+              <a:t>5/18/2015</a:t>
             </a:fld>
             <a:endParaRPr lang="en-US"/>
           </a:p>
@@ -616,7 +618,7 @@
           <a:p>
             <a:fld id="{65028CB8-6F2D-41FE-9209-0336CA312381}" type="datetimeFigureOut">
               <a:rPr lang="en-US" smtClean="0"/>
-              <a:t>1/3/2015</a:t>
+              <a:t>5/18/2015</a:t>
             </a:fld>
             <a:endParaRPr lang="en-US"/>
           </a:p>
@@ -786,7 +788,7 @@
           <a:p>
             <a:fld id="{65028CB8-6F2D-41FE-9209-0336CA312381}" type="datetimeFigureOut">
               <a:rPr lang="en-US" smtClean="0"/>
-              <a:t>1/3/2015</a:t>
+              <a:t>5/18/2015</a:t>
             </a:fld>
             <a:endParaRPr lang="en-US"/>
           </a:p>
@@ -1032,7 +1034,7 @@
           <a:p>
             <a:fld id="{65028CB8-6F2D-41FE-9209-0336CA312381}" type="datetimeFigureOut">
               <a:rPr lang="en-US" smtClean="0"/>
-              <a:t>1/3/2015</a:t>
+              <a:t>5/18/2015</a:t>
             </a:fld>
             <a:endParaRPr lang="en-US"/>
           </a:p>
@@ -1264,7 +1266,7 @@
           <a:p>
             <a:fld id="{65028CB8-6F2D-41FE-9209-0336CA312381}" type="datetimeFigureOut">
               <a:rPr lang="en-US" smtClean="0"/>
-              <a:t>1/3/2015</a:t>
+              <a:t>5/18/2015</a:t>
             </a:fld>
             <a:endParaRPr lang="en-US"/>
           </a:p>
@@ -1631,7 +1633,7 @@
           <a:p>
             <a:fld id="{65028CB8-6F2D-41FE-9209-0336CA312381}" type="datetimeFigureOut">
               <a:rPr lang="en-US" smtClean="0"/>
-              <a:t>1/3/2015</a:t>
+              <a:t>5/18/2015</a:t>
             </a:fld>
             <a:endParaRPr lang="en-US"/>
           </a:p>
@@ -1749,7 +1751,7 @@
           <a:p>
             <a:fld id="{65028CB8-6F2D-41FE-9209-0336CA312381}" type="datetimeFigureOut">
               <a:rPr lang="en-US" smtClean="0"/>
-              <a:t>1/3/2015</a:t>
+              <a:t>5/18/2015</a:t>
             </a:fld>
             <a:endParaRPr lang="en-US"/>
           </a:p>
@@ -1844,7 +1846,7 @@
           <a:p>
             <a:fld id="{65028CB8-6F2D-41FE-9209-0336CA312381}" type="datetimeFigureOut">
               <a:rPr lang="en-US" smtClean="0"/>
-              <a:t>1/3/2015</a:t>
+              <a:t>5/18/2015</a:t>
             </a:fld>
             <a:endParaRPr lang="en-US"/>
           </a:p>
@@ -2121,7 +2123,7 @@
           <a:p>
             <a:fld id="{65028CB8-6F2D-41FE-9209-0336CA312381}" type="datetimeFigureOut">
               <a:rPr lang="en-US" smtClean="0"/>
-              <a:t>1/3/2015</a:t>
+              <a:t>5/18/2015</a:t>
             </a:fld>
             <a:endParaRPr lang="en-US"/>
           </a:p>
@@ -2374,7 +2376,7 @@
           <a:p>
             <a:fld id="{65028CB8-6F2D-41FE-9209-0336CA312381}" type="datetimeFigureOut">
               <a:rPr lang="en-US" smtClean="0"/>
-              <a:t>1/3/2015</a:t>
+              <a:t>5/18/2015</a:t>
             </a:fld>
             <a:endParaRPr lang="en-US"/>
           </a:p>
@@ -2587,7 +2589,7 @@
           <a:p>
             <a:fld id="{65028CB8-6F2D-41FE-9209-0336CA312381}" type="datetimeFigureOut">
               <a:rPr lang="en-US" smtClean="0"/>
-              <a:t>1/3/2015</a:t>
+              <a:t>5/18/2015</a:t>
             </a:fld>
             <a:endParaRPr lang="en-US"/>
           </a:p>
@@ -3038,7 +3040,7 @@
           <a:p>
             <a:r>
               <a:rPr lang="en-US" dirty="0" smtClean="0"/>
-              <a:t>10 January 2015</a:t>
+              <a:t>14 April 2015</a:t>
             </a:r>
             <a:endParaRPr lang="en-US" dirty="0"/>
           </a:p>
@@ -3067,11 +3069,7 @@
           <a:p>
             <a:r>
               <a:rPr lang="en-US" i="1" dirty="0" smtClean="0"/>
-              <a:t>Presentation © Logos Electromechanical LLC </a:t>
-            </a:r>
-            <a:r>
-              <a:rPr lang="en-US" i="1" dirty="0" smtClean="0"/>
-              <a:t>2015</a:t>
+              <a:t>Presentation © Logos Electromechanical LLC 2015</a:t>
             </a:r>
             <a:endParaRPr lang="en-US" i="1" dirty="0"/>
           </a:p>
@@ -4528,11 +4526,7 @@
             </a:r>
             <a:r>
               <a:rPr lang="en-US" dirty="0" smtClean="0"/>
-              <a:t>() simulates the given voltage by turning the target pin on and off quickly with a variable duty cycle</a:t>
-            </a:r>
-            <a:r>
-              <a:rPr lang="en-US" dirty="0" smtClean="0"/>
-              <a:t>.</a:t>
+              <a:t>() simulates the given voltage by turning the target pin on and off quickly with a variable duty cycle.</a:t>
             </a:r>
           </a:p>
           <a:p>
@@ -4662,6 +4656,231 @@
 </file>
 
 <file path=ppt/slides/slide22.xml><?xml version="1.0" encoding="utf-8"?>
+<p:sld xmlns:a="http://schemas.openxmlformats.org/drawingml/2006/main" xmlns:r="http://schemas.openxmlformats.org/officeDocument/2006/relationships" xmlns:p="http://schemas.openxmlformats.org/presentationml/2006/main">
+  <p:cSld>
+    <p:spTree>
+      <p:nvGrpSpPr>
+        <p:cNvPr id="1" name=""/>
+        <p:cNvGrpSpPr/>
+        <p:nvPr/>
+      </p:nvGrpSpPr>
+      <p:grpSpPr>
+        <a:xfrm>
+          <a:off x="0" y="0"/>
+          <a:ext cx="0" cy="0"/>
+          <a:chOff x="0" y="0"/>
+          <a:chExt cx="0" cy="0"/>
+        </a:xfrm>
+      </p:grpSpPr>
+      <p:sp>
+        <p:nvSpPr>
+          <p:cNvPr id="2" name="Title 1"/>
+          <p:cNvSpPr>
+            <a:spLocks noGrp="1"/>
+          </p:cNvSpPr>
+          <p:nvPr>
+            <p:ph type="title"/>
+          </p:nvPr>
+        </p:nvSpPr>
+        <p:spPr/>
+        <p:txBody>
+          <a:bodyPr/>
+          <a:lstStyle/>
+          <a:p>
+            <a:r>
+              <a:rPr lang="en-US" dirty="0" err="1" smtClean="0"/>
+              <a:t>SerialRead</a:t>
+            </a:r>
+            <a:endParaRPr lang="en-US" dirty="0"/>
+          </a:p>
+        </p:txBody>
+      </p:sp>
+      <p:sp>
+        <p:nvSpPr>
+          <p:cNvPr id="3" name="Content Placeholder 2"/>
+          <p:cNvSpPr>
+            <a:spLocks noGrp="1"/>
+          </p:cNvSpPr>
+          <p:nvPr>
+            <p:ph idx="1"/>
+          </p:nvPr>
+        </p:nvSpPr>
+        <p:spPr/>
+        <p:txBody>
+          <a:bodyPr/>
+          <a:lstStyle/>
+          <a:p>
+            <a:r>
+              <a:rPr lang="en-US" dirty="0" smtClean="0"/>
+              <a:t>Same wiring setup as the </a:t>
+            </a:r>
+            <a:r>
+              <a:rPr lang="en-US" dirty="0" err="1" smtClean="0"/>
+              <a:t>AnalogLEDControl</a:t>
+            </a:r>
+            <a:r>
+              <a:rPr lang="en-US" dirty="0" smtClean="0"/>
+              <a:t> example</a:t>
+            </a:r>
+          </a:p>
+          <a:p>
+            <a:r>
+              <a:rPr lang="en-US" dirty="0" smtClean="0"/>
+              <a:t>Uses </a:t>
+            </a:r>
+            <a:r>
+              <a:rPr lang="en-US" dirty="0" err="1" smtClean="0"/>
+              <a:t>Serial.read</a:t>
+            </a:r>
+            <a:r>
+              <a:rPr lang="en-US" dirty="0" smtClean="0"/>
+              <a:t>() to determine what to do</a:t>
+            </a:r>
+          </a:p>
+          <a:p>
+            <a:r>
+              <a:rPr lang="en-US" dirty="0" smtClean="0"/>
+              <a:t>Uses </a:t>
+            </a:r>
+            <a:r>
+              <a:rPr lang="en-US" dirty="0" err="1" smtClean="0"/>
+              <a:t>Serial.parseInt</a:t>
+            </a:r>
+            <a:r>
+              <a:rPr lang="en-US" dirty="0" smtClean="0"/>
+              <a:t>() to read in an integer</a:t>
+            </a:r>
+          </a:p>
+          <a:p>
+            <a:r>
+              <a:rPr lang="en-US" dirty="0" smtClean="0"/>
+              <a:t>Uses </a:t>
+            </a:r>
+            <a:r>
+              <a:rPr lang="en-US" dirty="0" err="1" smtClean="0"/>
+              <a:t>millis</a:t>
+            </a:r>
+            <a:r>
+              <a:rPr lang="en-US" dirty="0" smtClean="0"/>
+              <a:t>() to figure out what time </a:t>
+            </a:r>
+            <a:r>
+              <a:rPr lang="en-US" smtClean="0"/>
+              <a:t>it is</a:t>
+            </a:r>
+            <a:endParaRPr lang="en-US" dirty="0" smtClean="0"/>
+          </a:p>
+          <a:p>
+            <a:endParaRPr lang="en-US" dirty="0"/>
+          </a:p>
+        </p:txBody>
+      </p:sp>
+    </p:spTree>
+    <p:extLst>
+      <p:ext uri="{BB962C8B-B14F-4D97-AF65-F5344CB8AC3E}">
+        <p14:creationId xmlns:p14="http://schemas.microsoft.com/office/powerpoint/2010/main" val="2641276987"/>
+      </p:ext>
+    </p:extLst>
+  </p:cSld>
+  <p:clrMapOvr>
+    <a:masterClrMapping/>
+  </p:clrMapOvr>
+  <p:timing>
+    <p:tnLst>
+      <p:par>
+        <p:cTn id="1" dur="indefinite" restart="never" nodeType="tmRoot"/>
+      </p:par>
+    </p:tnLst>
+  </p:timing>
+</p:sld>
+</file>
+
+<file path=ppt/slides/slide23.xml><?xml version="1.0" encoding="utf-8"?>
+<p:sld xmlns:a="http://schemas.openxmlformats.org/drawingml/2006/main" xmlns:r="http://schemas.openxmlformats.org/officeDocument/2006/relationships" xmlns:p="http://schemas.openxmlformats.org/presentationml/2006/main">
+  <p:cSld>
+    <p:spTree>
+      <p:nvGrpSpPr>
+        <p:cNvPr id="1" name=""/>
+        <p:cNvGrpSpPr/>
+        <p:nvPr/>
+      </p:nvGrpSpPr>
+      <p:grpSpPr>
+        <a:xfrm>
+          <a:off x="0" y="0"/>
+          <a:ext cx="0" cy="0"/>
+          <a:chOff x="0" y="0"/>
+          <a:chExt cx="0" cy="0"/>
+        </a:xfrm>
+      </p:grpSpPr>
+      <p:sp>
+        <p:nvSpPr>
+          <p:cNvPr id="2" name="Title 1"/>
+          <p:cNvSpPr>
+            <a:spLocks noGrp="1"/>
+          </p:cNvSpPr>
+          <p:nvPr>
+            <p:ph type="title"/>
+          </p:nvPr>
+        </p:nvSpPr>
+        <p:spPr/>
+        <p:txBody>
+          <a:bodyPr/>
+          <a:lstStyle/>
+          <a:p>
+            <a:endParaRPr lang="en-US"/>
+          </a:p>
+        </p:txBody>
+      </p:sp>
+      <p:pic>
+        <p:nvPicPr>
+          <p:cNvPr id="4" name="Content Placeholder 3"/>
+          <p:cNvPicPr>
+            <a:picLocks noGrp="1" noChangeAspect="1"/>
+          </p:cNvPicPr>
+          <p:nvPr>
+            <p:ph idx="1"/>
+          </p:nvPr>
+        </p:nvPicPr>
+        <p:blipFill>
+          <a:blip r:embed="rId2">
+            <a:extLst>
+              <a:ext uri="{28A0092B-C50C-407E-A947-70E740481C1C}">
+                <a14:useLocalDpi xmlns:a14="http://schemas.microsoft.com/office/drawing/2010/main" val="0"/>
+              </a:ext>
+            </a:extLst>
+          </a:blip>
+          <a:stretch>
+            <a:fillRect/>
+          </a:stretch>
+        </p:blipFill>
+        <p:spPr>
+          <a:xfrm>
+            <a:off x="2798412" y="14881"/>
+            <a:ext cx="6784127" cy="6843120"/>
+          </a:xfrm>
+        </p:spPr>
+      </p:pic>
+    </p:spTree>
+    <p:extLst>
+      <p:ext uri="{BB962C8B-B14F-4D97-AF65-F5344CB8AC3E}">
+        <p14:creationId xmlns:p14="http://schemas.microsoft.com/office/powerpoint/2010/main" val="1116292668"/>
+      </p:ext>
+    </p:extLst>
+  </p:cSld>
+  <p:clrMapOvr>
+    <a:masterClrMapping/>
+  </p:clrMapOvr>
+  <p:timing>
+    <p:tnLst>
+      <p:par>
+        <p:cTn id="1" dur="indefinite" restart="never" nodeType="tmRoot"/>
+      </p:par>
+    </p:tnLst>
+  </p:timing>
+</p:sld>
+</file>
+
+<file path=ppt/slides/slide24.xml><?xml version="1.0" encoding="utf-8"?>
 <p:sld xmlns:a="http://schemas.openxmlformats.org/drawingml/2006/main" xmlns:r="http://schemas.openxmlformats.org/officeDocument/2006/relationships" xmlns:p="http://schemas.openxmlformats.org/presentationml/2006/main">
   <p:cSld>
     <p:spTree>
@@ -4785,7 +5004,7 @@
 </p:sld>
 </file>
 
-<file path=ppt/slides/slide23.xml><?xml version="1.0" encoding="utf-8"?>
+<file path=ppt/slides/slide25.xml><?xml version="1.0" encoding="utf-8"?>
 <p:sld xmlns:a="http://schemas.openxmlformats.org/drawingml/2006/main" xmlns:r="http://schemas.openxmlformats.org/officeDocument/2006/relationships" xmlns:p="http://schemas.openxmlformats.org/presentationml/2006/main">
   <p:cSld>
     <p:spTree>
@@ -4904,7 +5123,7 @@
 </p:sld>
 </file>
 
-<file path=ppt/slides/slide24.xml><?xml version="1.0" encoding="utf-8"?>
+<file path=ppt/slides/slide26.xml><?xml version="1.0" encoding="utf-8"?>
 <p:sld xmlns:a="http://schemas.openxmlformats.org/drawingml/2006/main" xmlns:r="http://schemas.openxmlformats.org/officeDocument/2006/relationships" xmlns:p="http://schemas.openxmlformats.org/presentationml/2006/main">
   <p:cSld>
     <p:spTree>
@@ -5363,7 +5582,7 @@
           <a:p>
             <a:r>
               <a:rPr lang="en-US" dirty="0" smtClean="0"/>
-              <a:t>Download Arduino 1.0.5 installer from </a:t>
+              <a:t>Download Arduino 1.6.0 installer from </a:t>
             </a:r>
             <a:r>
               <a:rPr lang="en-US" dirty="0" smtClean="0">

</xml_diff>